<commit_message>
spelling correct .NET 6
</commit_message>
<xml_diff>
--- a/presentations/dotnetConf2020HCMC-NET5.pptx
+++ b/presentations/dotnetConf2020HCMC-NET5.pptx
@@ -174,322 +174,6 @@
 
 <file path=ppt/changesInfos/changesInfo1.xml><?xml version="1.0" encoding="utf-8"?>
 <pc:chgInfo xmlns:a="http://schemas.openxmlformats.org/drawingml/2006/main" xmlns:r="http://schemas.openxmlformats.org/officeDocument/2006/relationships" xmlns:ac="http://schemas.microsoft.com/office/drawing/2013/main/command" xmlns:pc="http://schemas.microsoft.com/office/powerpoint/2013/main/command">
-  <pc:docChgLst>
-    <pc:chgData name="Thien Nguyen Le Quynh" userId="57a43e30-6e77-464d-a565-b6c4b6c26d7f" providerId="ADAL" clId="{D9F54EBF-23BD-4BFC-8A23-82F896ADFCF4}"/>
-    <pc:docChg chg="undo custSel addSld delSld modSld sldOrd modSection">
-      <pc:chgData name="Thien Nguyen Le Quynh" userId="57a43e30-6e77-464d-a565-b6c4b6c26d7f" providerId="ADAL" clId="{D9F54EBF-23BD-4BFC-8A23-82F896ADFCF4}" dt="2020-11-18T04:52:14.080" v="440"/>
-      <pc:docMkLst>
-        <pc:docMk/>
-      </pc:docMkLst>
-      <pc:sldChg chg="addSp delSp modSp add ord addCm delCm">
-        <pc:chgData name="Thien Nguyen Le Quynh" userId="57a43e30-6e77-464d-a565-b6c4b6c26d7f" providerId="ADAL" clId="{D9F54EBF-23BD-4BFC-8A23-82F896ADFCF4}" dt="2020-11-18T04:34:51.911" v="382" actId="13822"/>
-        <pc:sldMkLst>
-          <pc:docMk/>
-          <pc:sldMk cId="2539014097" sldId="2089"/>
-        </pc:sldMkLst>
-        <pc:spChg chg="del">
-          <ac:chgData name="Thien Nguyen Le Quynh" userId="57a43e30-6e77-464d-a565-b6c4b6c26d7f" providerId="ADAL" clId="{D9F54EBF-23BD-4BFC-8A23-82F896ADFCF4}" dt="2020-11-18T04:11:24.747" v="3"/>
-          <ac:spMkLst>
-            <pc:docMk/>
-            <pc:sldMk cId="2539014097" sldId="2089"/>
-            <ac:spMk id="2" creationId="{A41ADA7A-F5DA-4B24-A1F4-8075E21F5096}"/>
-          </ac:spMkLst>
-        </pc:spChg>
-        <pc:spChg chg="del">
-          <ac:chgData name="Thien Nguyen Le Quynh" userId="57a43e30-6e77-464d-a565-b6c4b6c26d7f" providerId="ADAL" clId="{D9F54EBF-23BD-4BFC-8A23-82F896ADFCF4}" dt="2020-11-18T04:11:24.747" v="3"/>
-          <ac:spMkLst>
-            <pc:docMk/>
-            <pc:sldMk cId="2539014097" sldId="2089"/>
-            <ac:spMk id="3" creationId="{5AD0E18B-6517-45AD-94C8-1537EE2412AC}"/>
-          </ac:spMkLst>
-        </pc:spChg>
-        <pc:spChg chg="add mod">
-          <ac:chgData name="Thien Nguyen Le Quynh" userId="57a43e30-6e77-464d-a565-b6c4b6c26d7f" providerId="ADAL" clId="{D9F54EBF-23BD-4BFC-8A23-82F896ADFCF4}" dt="2020-11-18T04:12:35.412" v="26" actId="20577"/>
-          <ac:spMkLst>
-            <pc:docMk/>
-            <pc:sldMk cId="2539014097" sldId="2089"/>
-            <ac:spMk id="4" creationId="{DD1C9E67-1CB6-4771-8C93-396A96B42D83}"/>
-          </ac:spMkLst>
-        </pc:spChg>
-        <pc:spChg chg="add del mod">
-          <ac:chgData name="Thien Nguyen Le Quynh" userId="57a43e30-6e77-464d-a565-b6c4b6c26d7f" providerId="ADAL" clId="{D9F54EBF-23BD-4BFC-8A23-82F896ADFCF4}" dt="2020-11-18T04:12:42.103" v="27" actId="478"/>
-          <ac:spMkLst>
-            <pc:docMk/>
-            <pc:sldMk cId="2539014097" sldId="2089"/>
-            <ac:spMk id="5" creationId="{CB73742A-C692-44E2-A2D5-F6DDF1A7BF66}"/>
-          </ac:spMkLst>
-        </pc:spChg>
-        <pc:spChg chg="add mod">
-          <ac:chgData name="Thien Nguyen Le Quynh" userId="57a43e30-6e77-464d-a565-b6c4b6c26d7f" providerId="ADAL" clId="{D9F54EBF-23BD-4BFC-8A23-82F896ADFCF4}" dt="2020-11-18T04:23:28.770" v="356" actId="1036"/>
-          <ac:spMkLst>
-            <pc:docMk/>
-            <pc:sldMk cId="2539014097" sldId="2089"/>
-            <ac:spMk id="6" creationId="{0FBCE167-5877-47D7-9447-1A9DAC2EA357}"/>
-          </ac:spMkLst>
-        </pc:spChg>
-        <pc:spChg chg="add mod">
-          <ac:chgData name="Thien Nguyen Le Quynh" userId="57a43e30-6e77-464d-a565-b6c4b6c26d7f" providerId="ADAL" clId="{D9F54EBF-23BD-4BFC-8A23-82F896ADFCF4}" dt="2020-11-18T04:34:13.637" v="380" actId="207"/>
-          <ac:spMkLst>
-            <pc:docMk/>
-            <pc:sldMk cId="2539014097" sldId="2089"/>
-            <ac:spMk id="7" creationId="{EDBA8729-E4FB-4096-A8CC-19011C9B0906}"/>
-          </ac:spMkLst>
-        </pc:spChg>
-        <pc:spChg chg="add mod">
-          <ac:chgData name="Thien Nguyen Le Quynh" userId="57a43e30-6e77-464d-a565-b6c4b6c26d7f" providerId="ADAL" clId="{D9F54EBF-23BD-4BFC-8A23-82F896ADFCF4}" dt="2020-11-18T04:23:28.770" v="356" actId="1036"/>
-          <ac:spMkLst>
-            <pc:docMk/>
-            <pc:sldMk cId="2539014097" sldId="2089"/>
-            <ac:spMk id="8" creationId="{6880087D-D974-4361-9874-E01F00FFCBF0}"/>
-          </ac:spMkLst>
-        </pc:spChg>
-        <pc:spChg chg="add del mod">
-          <ac:chgData name="Thien Nguyen Le Quynh" userId="57a43e30-6e77-464d-a565-b6c4b6c26d7f" providerId="ADAL" clId="{D9F54EBF-23BD-4BFC-8A23-82F896ADFCF4}" dt="2020-11-18T04:14:42.190" v="112" actId="478"/>
-          <ac:spMkLst>
-            <pc:docMk/>
-            <pc:sldMk cId="2539014097" sldId="2089"/>
-            <ac:spMk id="9" creationId="{F742374F-6450-4650-AC05-4FBCA9E18C7E}"/>
-          </ac:spMkLst>
-        </pc:spChg>
-        <pc:spChg chg="add mod">
-          <ac:chgData name="Thien Nguyen Le Quynh" userId="57a43e30-6e77-464d-a565-b6c4b6c26d7f" providerId="ADAL" clId="{D9F54EBF-23BD-4BFC-8A23-82F896ADFCF4}" dt="2020-11-18T04:34:23.799" v="381" actId="207"/>
-          <ac:spMkLst>
-            <pc:docMk/>
-            <pc:sldMk cId="2539014097" sldId="2089"/>
-            <ac:spMk id="10" creationId="{44782C53-65B8-474D-AA06-BD0B0E0E4F66}"/>
-          </ac:spMkLst>
-        </pc:spChg>
-        <pc:spChg chg="add mod">
-          <ac:chgData name="Thien Nguyen Le Quynh" userId="57a43e30-6e77-464d-a565-b6c4b6c26d7f" providerId="ADAL" clId="{D9F54EBF-23BD-4BFC-8A23-82F896ADFCF4}" dt="2020-11-18T04:27:03.147" v="369" actId="20577"/>
-          <ac:spMkLst>
-            <pc:docMk/>
-            <pc:sldMk cId="2539014097" sldId="2089"/>
-            <ac:spMk id="18" creationId="{6A600DD4-E11F-4F87-A325-472A178B5916}"/>
-          </ac:spMkLst>
-        </pc:spChg>
-        <pc:spChg chg="add mod">
-          <ac:chgData name="Thien Nguyen Le Quynh" userId="57a43e30-6e77-464d-a565-b6c4b6c26d7f" providerId="ADAL" clId="{D9F54EBF-23BD-4BFC-8A23-82F896ADFCF4}" dt="2020-11-18T04:27:08.089" v="374" actId="20577"/>
-          <ac:spMkLst>
-            <pc:docMk/>
-            <pc:sldMk cId="2539014097" sldId="2089"/>
-            <ac:spMk id="19" creationId="{EB1F3AD0-0B68-4284-AB2C-F237F5102B3A}"/>
-          </ac:spMkLst>
-        </pc:spChg>
-        <pc:spChg chg="add mod">
-          <ac:chgData name="Thien Nguyen Le Quynh" userId="57a43e30-6e77-464d-a565-b6c4b6c26d7f" providerId="ADAL" clId="{D9F54EBF-23BD-4BFC-8A23-82F896ADFCF4}" dt="2020-11-18T04:22:15.720" v="299" actId="20577"/>
-          <ac:spMkLst>
-            <pc:docMk/>
-            <pc:sldMk cId="2539014097" sldId="2089"/>
-            <ac:spMk id="23" creationId="{115E1A4F-AFD2-415C-BE18-95D2B471154A}"/>
-          </ac:spMkLst>
-        </pc:spChg>
-        <pc:cxnChg chg="add mod">
-          <ac:chgData name="Thien Nguyen Le Quynh" userId="57a43e30-6e77-464d-a565-b6c4b6c26d7f" providerId="ADAL" clId="{D9F54EBF-23BD-4BFC-8A23-82F896ADFCF4}" dt="2020-11-18T04:34:51.911" v="382" actId="13822"/>
-          <ac:cxnSpMkLst>
-            <pc:docMk/>
-            <pc:sldMk cId="2539014097" sldId="2089"/>
-            <ac:cxnSpMk id="12" creationId="{B259A724-50DE-4349-8368-FB794D07CE46}"/>
-          </ac:cxnSpMkLst>
-        </pc:cxnChg>
-        <pc:cxnChg chg="add mod">
-          <ac:chgData name="Thien Nguyen Le Quynh" userId="57a43e30-6e77-464d-a565-b6c4b6c26d7f" providerId="ADAL" clId="{D9F54EBF-23BD-4BFC-8A23-82F896ADFCF4}" dt="2020-11-18T04:34:51.911" v="382" actId="13822"/>
-          <ac:cxnSpMkLst>
-            <pc:docMk/>
-            <pc:sldMk cId="2539014097" sldId="2089"/>
-            <ac:cxnSpMk id="14" creationId="{429828D8-2F22-428F-9C46-4CD656BBEE57}"/>
-          </ac:cxnSpMkLst>
-        </pc:cxnChg>
-        <pc:cxnChg chg="add mod">
-          <ac:chgData name="Thien Nguyen Le Quynh" userId="57a43e30-6e77-464d-a565-b6c4b6c26d7f" providerId="ADAL" clId="{D9F54EBF-23BD-4BFC-8A23-82F896ADFCF4}" dt="2020-11-18T04:34:51.911" v="382" actId="13822"/>
-          <ac:cxnSpMkLst>
-            <pc:docMk/>
-            <pc:sldMk cId="2539014097" sldId="2089"/>
-            <ac:cxnSpMk id="17" creationId="{62F0360D-47B7-4058-8E36-CAC6AC813A3E}"/>
-          </ac:cxnSpMkLst>
-        </pc:cxnChg>
-      </pc:sldChg>
-      <pc:sldChg chg="addSp delSp modSp add ord">
-        <pc:chgData name="Thien Nguyen Le Quynh" userId="57a43e30-6e77-464d-a565-b6c4b6c26d7f" providerId="ADAL" clId="{D9F54EBF-23BD-4BFC-8A23-82F896ADFCF4}" dt="2020-11-18T04:52:14.080" v="440"/>
-        <pc:sldMkLst>
-          <pc:docMk/>
-          <pc:sldMk cId="2013221423" sldId="2090"/>
-        </pc:sldMkLst>
-        <pc:spChg chg="del">
-          <ac:chgData name="Thien Nguyen Le Quynh" userId="57a43e30-6e77-464d-a565-b6c4b6c26d7f" providerId="ADAL" clId="{D9F54EBF-23BD-4BFC-8A23-82F896ADFCF4}" dt="2020-11-18T04:23:04.746" v="300"/>
-          <ac:spMkLst>
-            <pc:docMk/>
-            <pc:sldMk cId="2013221423" sldId="2090"/>
-            <ac:spMk id="2" creationId="{575DE408-059E-40F3-AF26-C5B8B55D5130}"/>
-          </ac:spMkLst>
-        </pc:spChg>
-        <pc:spChg chg="del">
-          <ac:chgData name="Thien Nguyen Le Quynh" userId="57a43e30-6e77-464d-a565-b6c4b6c26d7f" providerId="ADAL" clId="{D9F54EBF-23BD-4BFC-8A23-82F896ADFCF4}" dt="2020-11-18T04:23:04.746" v="300"/>
-          <ac:spMkLst>
-            <pc:docMk/>
-            <pc:sldMk cId="2013221423" sldId="2090"/>
-            <ac:spMk id="3" creationId="{9A5B38C2-87DE-42DB-91C4-31B85545E602}"/>
-          </ac:spMkLst>
-        </pc:spChg>
-        <pc:spChg chg="add mod">
-          <ac:chgData name="Thien Nguyen Le Quynh" userId="57a43e30-6e77-464d-a565-b6c4b6c26d7f" providerId="ADAL" clId="{D9F54EBF-23BD-4BFC-8A23-82F896ADFCF4}" dt="2020-11-18T04:23:17.833" v="334" actId="20577"/>
-          <ac:spMkLst>
-            <pc:docMk/>
-            <pc:sldMk cId="2013221423" sldId="2090"/>
-            <ac:spMk id="4" creationId="{942D2590-7D3B-4777-81DB-254548644C23}"/>
-          </ac:spMkLst>
-        </pc:spChg>
-        <pc:spChg chg="add mod">
-          <ac:chgData name="Thien Nguyen Le Quynh" userId="57a43e30-6e77-464d-a565-b6c4b6c26d7f" providerId="ADAL" clId="{D9F54EBF-23BD-4BFC-8A23-82F896ADFCF4}" dt="2020-11-18T04:23:04.746" v="300"/>
-          <ac:spMkLst>
-            <pc:docMk/>
-            <pc:sldMk cId="2013221423" sldId="2090"/>
-            <ac:spMk id="5" creationId="{19BFC74E-262A-4C36-8249-C019BB1146EF}"/>
-          </ac:spMkLst>
-        </pc:spChg>
-      </pc:sldChg>
-      <pc:sldChg chg="addSp delSp add del">
-        <pc:chgData name="Thien Nguyen Le Quynh" userId="57a43e30-6e77-464d-a565-b6c4b6c26d7f" providerId="ADAL" clId="{D9F54EBF-23BD-4BFC-8A23-82F896ADFCF4}" dt="2020-11-18T04:49:43.148" v="430" actId="2696"/>
-        <pc:sldMkLst>
-          <pc:docMk/>
-          <pc:sldMk cId="3359376004" sldId="2091"/>
-        </pc:sldMkLst>
-        <pc:spChg chg="del">
-          <ac:chgData name="Thien Nguyen Le Quynh" userId="57a43e30-6e77-464d-a565-b6c4b6c26d7f" providerId="ADAL" clId="{D9F54EBF-23BD-4BFC-8A23-82F896ADFCF4}" dt="2020-11-18T04:33:36.477" v="376" actId="478"/>
-          <ac:spMkLst>
-            <pc:docMk/>
-            <pc:sldMk cId="3359376004" sldId="2091"/>
-            <ac:spMk id="2" creationId="{D9C58F30-73FB-481D-9352-AF6E349AAA70}"/>
-          </ac:spMkLst>
-        </pc:spChg>
-        <pc:spChg chg="del">
-          <ac:chgData name="Thien Nguyen Le Quynh" userId="57a43e30-6e77-464d-a565-b6c4b6c26d7f" providerId="ADAL" clId="{D9F54EBF-23BD-4BFC-8A23-82F896ADFCF4}" dt="2020-11-18T04:33:38.218" v="377" actId="478"/>
-          <ac:spMkLst>
-            <pc:docMk/>
-            <pc:sldMk cId="3359376004" sldId="2091"/>
-            <ac:spMk id="3" creationId="{A379311C-C7E5-4964-8F84-1F62A9D1FEA4}"/>
-          </ac:spMkLst>
-        </pc:spChg>
-        <pc:picChg chg="add del">
-          <ac:chgData name="Thien Nguyen Le Quynh" userId="57a43e30-6e77-464d-a565-b6c4b6c26d7f" providerId="ADAL" clId="{D9F54EBF-23BD-4BFC-8A23-82F896ADFCF4}" dt="2020-11-18T04:49:16.835" v="427" actId="478"/>
-          <ac:picMkLst>
-            <pc:docMk/>
-            <pc:sldMk cId="3359376004" sldId="2091"/>
-            <ac:picMk id="1026" creationId="{068AC992-0711-4077-8CFB-C136A1426F6D}"/>
-          </ac:picMkLst>
-        </pc:picChg>
-      </pc:sldChg>
-      <pc:sldChg chg="addSp modSp add">
-        <pc:chgData name="Thien Nguyen Le Quynh" userId="57a43e30-6e77-464d-a565-b6c4b6c26d7f" providerId="ADAL" clId="{D9F54EBF-23BD-4BFC-8A23-82F896ADFCF4}" dt="2020-11-18T04:45:20.145" v="425" actId="27636"/>
-        <pc:sldMkLst>
-          <pc:docMk/>
-          <pc:sldMk cId="732496175" sldId="2092"/>
-        </pc:sldMkLst>
-        <pc:spChg chg="mod">
-          <ac:chgData name="Thien Nguyen Le Quynh" userId="57a43e30-6e77-464d-a565-b6c4b6c26d7f" providerId="ADAL" clId="{D9F54EBF-23BD-4BFC-8A23-82F896ADFCF4}" dt="2020-11-18T04:44:26.398" v="398" actId="20577"/>
-          <ac:spMkLst>
-            <pc:docMk/>
-            <pc:sldMk cId="732496175" sldId="2092"/>
-            <ac:spMk id="2" creationId="{9C7B1620-D7AA-463A-BDF5-B699B58A0278}"/>
-          </ac:spMkLst>
-        </pc:spChg>
-        <pc:spChg chg="mod">
-          <ac:chgData name="Thien Nguyen Le Quynh" userId="57a43e30-6e77-464d-a565-b6c4b6c26d7f" providerId="ADAL" clId="{D9F54EBF-23BD-4BFC-8A23-82F896ADFCF4}" dt="2020-11-18T04:45:20.145" v="425" actId="27636"/>
-          <ac:spMkLst>
-            <pc:docMk/>
-            <pc:sldMk cId="732496175" sldId="2092"/>
-            <ac:spMk id="3" creationId="{AF89AE30-DDBC-41F5-9D1B-030649C92CDB}"/>
-          </ac:spMkLst>
-        </pc:spChg>
-        <pc:grpChg chg="add mod">
-          <ac:chgData name="Thien Nguyen Le Quynh" userId="57a43e30-6e77-464d-a565-b6c4b6c26d7f" providerId="ADAL" clId="{D9F54EBF-23BD-4BFC-8A23-82F896ADFCF4}" dt="2020-11-18T04:45:16.455" v="423" actId="1036"/>
-          <ac:grpSpMkLst>
-            <pc:docMk/>
-            <pc:sldMk cId="732496175" sldId="2092"/>
-            <ac:grpSpMk id="5" creationId="{40824225-9CD2-445C-921B-DD52E6D4BE66}"/>
-          </ac:grpSpMkLst>
-        </pc:grpChg>
-        <pc:cxnChg chg="add mod">
-          <ac:chgData name="Thien Nguyen Le Quynh" userId="57a43e30-6e77-464d-a565-b6c4b6c26d7f" providerId="ADAL" clId="{D9F54EBF-23BD-4BFC-8A23-82F896ADFCF4}" dt="2020-11-18T04:45:16.455" v="423" actId="1036"/>
-          <ac:cxnSpMkLst>
-            <pc:docMk/>
-            <pc:sldMk cId="732496175" sldId="2092"/>
-            <ac:cxnSpMk id="4" creationId="{0B5519BA-04BE-40AC-B7C8-DBCA6C404F3E}"/>
-          </ac:cxnSpMkLst>
-        </pc:cxnChg>
-      </pc:sldChg>
-      <pc:sldChg chg="addSp delSp modSp add modAnim">
-        <pc:chgData name="Thien Nguyen Le Quynh" userId="57a43e30-6e77-464d-a565-b6c4b6c26d7f" providerId="ADAL" clId="{D9F54EBF-23BD-4BFC-8A23-82F896ADFCF4}" dt="2020-11-18T04:51:54.583" v="439"/>
-        <pc:sldMkLst>
-          <pc:docMk/>
-          <pc:sldMk cId="2021647859" sldId="2093"/>
-        </pc:sldMkLst>
-        <pc:spChg chg="del">
-          <ac:chgData name="Thien Nguyen Le Quynh" userId="57a43e30-6e77-464d-a565-b6c4b6c26d7f" providerId="ADAL" clId="{D9F54EBF-23BD-4BFC-8A23-82F896ADFCF4}" dt="2020-11-18T04:50:06.329" v="432"/>
-          <ac:spMkLst>
-            <pc:docMk/>
-            <pc:sldMk cId="2021647859" sldId="2093"/>
-            <ac:spMk id="2" creationId="{48FDD36A-7745-40D9-A6E6-86BDDA28D6B8}"/>
-          </ac:spMkLst>
-        </pc:spChg>
-        <pc:spChg chg="del">
-          <ac:chgData name="Thien Nguyen Le Quynh" userId="57a43e30-6e77-464d-a565-b6c4b6c26d7f" providerId="ADAL" clId="{D9F54EBF-23BD-4BFC-8A23-82F896ADFCF4}" dt="2020-11-18T04:50:06.329" v="432"/>
-          <ac:spMkLst>
-            <pc:docMk/>
-            <pc:sldMk cId="2021647859" sldId="2093"/>
-            <ac:spMk id="3" creationId="{54C5C48C-7C26-420E-847C-1422A16FFDA2}"/>
-          </ac:spMkLst>
-        </pc:spChg>
-        <pc:spChg chg="add mod">
-          <ac:chgData name="Thien Nguyen Le Quynh" userId="57a43e30-6e77-464d-a565-b6c4b6c26d7f" providerId="ADAL" clId="{D9F54EBF-23BD-4BFC-8A23-82F896ADFCF4}" dt="2020-11-18T04:50:35.952" v="435" actId="207"/>
-          <ac:spMkLst>
-            <pc:docMk/>
-            <pc:sldMk cId="2021647859" sldId="2093"/>
-            <ac:spMk id="4" creationId="{B78105FA-2B6E-4857-AEE4-C0E7A69CA575}"/>
-          </ac:spMkLst>
-        </pc:spChg>
-        <pc:spChg chg="add mod">
-          <ac:chgData name="Thien Nguyen Le Quynh" userId="57a43e30-6e77-464d-a565-b6c4b6c26d7f" providerId="ADAL" clId="{D9F54EBF-23BD-4BFC-8A23-82F896ADFCF4}" dt="2020-11-18T04:50:35.952" v="435" actId="207"/>
-          <ac:spMkLst>
-            <pc:docMk/>
-            <pc:sldMk cId="2021647859" sldId="2093"/>
-            <ac:spMk id="5" creationId="{490117F7-62B8-4472-BFE0-A1A55B481BC1}"/>
-          </ac:spMkLst>
-        </pc:spChg>
-        <pc:grpChg chg="add mod">
-          <ac:chgData name="Thien Nguyen Le Quynh" userId="57a43e30-6e77-464d-a565-b6c4b6c26d7f" providerId="ADAL" clId="{D9F54EBF-23BD-4BFC-8A23-82F896ADFCF4}" dt="2020-11-18T04:50:35.952" v="435" actId="207"/>
-          <ac:grpSpMkLst>
-            <pc:docMk/>
-            <pc:sldMk cId="2021647859" sldId="2093"/>
-            <ac:grpSpMk id="6" creationId="{8FD0B487-378C-4CAE-AD94-1BC01F25D18C}"/>
-          </ac:grpSpMkLst>
-        </pc:grpChg>
-        <pc:picChg chg="add del mod">
-          <ac:chgData name="Thien Nguyen Le Quynh" userId="57a43e30-6e77-464d-a565-b6c4b6c26d7f" providerId="ADAL" clId="{D9F54EBF-23BD-4BFC-8A23-82F896ADFCF4}" dt="2020-11-18T04:51:04.989" v="436" actId="478"/>
-          <ac:picMkLst>
-            <pc:docMk/>
-            <pc:sldMk cId="2021647859" sldId="2093"/>
-            <ac:picMk id="79" creationId="{0437BD30-665E-4171-B5B9-072856AD815E}"/>
-          </ac:picMkLst>
-        </pc:picChg>
-        <pc:picChg chg="add del">
-          <ac:chgData name="Thien Nguyen Le Quynh" userId="57a43e30-6e77-464d-a565-b6c4b6c26d7f" providerId="ADAL" clId="{D9F54EBF-23BD-4BFC-8A23-82F896ADFCF4}" dt="2020-11-18T04:51:51.821" v="438"/>
-          <ac:picMkLst>
-            <pc:docMk/>
-            <pc:sldMk cId="2021647859" sldId="2093"/>
-            <ac:picMk id="80" creationId="{9B1A0556-64F0-4A0A-9122-F113D61BF45D}"/>
-          </ac:picMkLst>
-        </pc:picChg>
-        <pc:picChg chg="add">
-          <ac:chgData name="Thien Nguyen Le Quynh" userId="57a43e30-6e77-464d-a565-b6c4b6c26d7f" providerId="ADAL" clId="{D9F54EBF-23BD-4BFC-8A23-82F896ADFCF4}" dt="2020-11-18T04:51:54.583" v="439"/>
-          <ac:picMkLst>
-            <pc:docMk/>
-            <pc:sldMk cId="2021647859" sldId="2093"/>
-            <ac:picMk id="81" creationId="{396AE672-DB15-4DC0-AD26-DD098A8904F8}"/>
-          </ac:picMkLst>
-        </pc:picChg>
-      </pc:sldChg>
-    </pc:docChg>
-  </pc:docChgLst>
   <pc:docChgLst>
     <pc:chgData name="Thien Nguyen Le Quynh" userId="57a43e30-6e77-464d-a565-b6c4b6c26d7f" providerId="ADAL" clId="{0C8CFC02-5037-4AFC-AD09-192D44344E75}"/>
     <pc:docChg chg="undo custSel addSld delSld modSld sldOrd modSection">
@@ -824,6 +508,322 @@
             <ac:spMk id="3" creationId="{F3360D65-718C-4AC4-9A16-5E1C550FA24B}"/>
           </ac:spMkLst>
         </pc:spChg>
+      </pc:sldChg>
+    </pc:docChg>
+  </pc:docChgLst>
+  <pc:docChgLst>
+    <pc:chgData name="Thien Nguyen Le Quynh" userId="57a43e30-6e77-464d-a565-b6c4b6c26d7f" providerId="ADAL" clId="{D9F54EBF-23BD-4BFC-8A23-82F896ADFCF4}"/>
+    <pc:docChg chg="undo custSel addSld delSld modSld sldOrd modSection">
+      <pc:chgData name="Thien Nguyen Le Quynh" userId="57a43e30-6e77-464d-a565-b6c4b6c26d7f" providerId="ADAL" clId="{D9F54EBF-23BD-4BFC-8A23-82F896ADFCF4}" dt="2020-11-18T04:52:14.080" v="440"/>
+      <pc:docMkLst>
+        <pc:docMk/>
+      </pc:docMkLst>
+      <pc:sldChg chg="addSp delSp modSp add ord addCm delCm">
+        <pc:chgData name="Thien Nguyen Le Quynh" userId="57a43e30-6e77-464d-a565-b6c4b6c26d7f" providerId="ADAL" clId="{D9F54EBF-23BD-4BFC-8A23-82F896ADFCF4}" dt="2020-11-18T04:34:51.911" v="382" actId="13822"/>
+        <pc:sldMkLst>
+          <pc:docMk/>
+          <pc:sldMk cId="2539014097" sldId="2089"/>
+        </pc:sldMkLst>
+        <pc:spChg chg="del">
+          <ac:chgData name="Thien Nguyen Le Quynh" userId="57a43e30-6e77-464d-a565-b6c4b6c26d7f" providerId="ADAL" clId="{D9F54EBF-23BD-4BFC-8A23-82F896ADFCF4}" dt="2020-11-18T04:11:24.747" v="3"/>
+          <ac:spMkLst>
+            <pc:docMk/>
+            <pc:sldMk cId="2539014097" sldId="2089"/>
+            <ac:spMk id="2" creationId="{A41ADA7A-F5DA-4B24-A1F4-8075E21F5096}"/>
+          </ac:spMkLst>
+        </pc:spChg>
+        <pc:spChg chg="del">
+          <ac:chgData name="Thien Nguyen Le Quynh" userId="57a43e30-6e77-464d-a565-b6c4b6c26d7f" providerId="ADAL" clId="{D9F54EBF-23BD-4BFC-8A23-82F896ADFCF4}" dt="2020-11-18T04:11:24.747" v="3"/>
+          <ac:spMkLst>
+            <pc:docMk/>
+            <pc:sldMk cId="2539014097" sldId="2089"/>
+            <ac:spMk id="3" creationId="{5AD0E18B-6517-45AD-94C8-1537EE2412AC}"/>
+          </ac:spMkLst>
+        </pc:spChg>
+        <pc:spChg chg="add mod">
+          <ac:chgData name="Thien Nguyen Le Quynh" userId="57a43e30-6e77-464d-a565-b6c4b6c26d7f" providerId="ADAL" clId="{D9F54EBF-23BD-4BFC-8A23-82F896ADFCF4}" dt="2020-11-18T04:12:35.412" v="26" actId="20577"/>
+          <ac:spMkLst>
+            <pc:docMk/>
+            <pc:sldMk cId="2539014097" sldId="2089"/>
+            <ac:spMk id="4" creationId="{DD1C9E67-1CB6-4771-8C93-396A96B42D83}"/>
+          </ac:spMkLst>
+        </pc:spChg>
+        <pc:spChg chg="add del mod">
+          <ac:chgData name="Thien Nguyen Le Quynh" userId="57a43e30-6e77-464d-a565-b6c4b6c26d7f" providerId="ADAL" clId="{D9F54EBF-23BD-4BFC-8A23-82F896ADFCF4}" dt="2020-11-18T04:12:42.103" v="27" actId="478"/>
+          <ac:spMkLst>
+            <pc:docMk/>
+            <pc:sldMk cId="2539014097" sldId="2089"/>
+            <ac:spMk id="5" creationId="{CB73742A-C692-44E2-A2D5-F6DDF1A7BF66}"/>
+          </ac:spMkLst>
+        </pc:spChg>
+        <pc:spChg chg="add mod">
+          <ac:chgData name="Thien Nguyen Le Quynh" userId="57a43e30-6e77-464d-a565-b6c4b6c26d7f" providerId="ADAL" clId="{D9F54EBF-23BD-4BFC-8A23-82F896ADFCF4}" dt="2020-11-18T04:23:28.770" v="356" actId="1036"/>
+          <ac:spMkLst>
+            <pc:docMk/>
+            <pc:sldMk cId="2539014097" sldId="2089"/>
+            <ac:spMk id="6" creationId="{0FBCE167-5877-47D7-9447-1A9DAC2EA357}"/>
+          </ac:spMkLst>
+        </pc:spChg>
+        <pc:spChg chg="add mod">
+          <ac:chgData name="Thien Nguyen Le Quynh" userId="57a43e30-6e77-464d-a565-b6c4b6c26d7f" providerId="ADAL" clId="{D9F54EBF-23BD-4BFC-8A23-82F896ADFCF4}" dt="2020-11-18T04:34:13.637" v="380" actId="207"/>
+          <ac:spMkLst>
+            <pc:docMk/>
+            <pc:sldMk cId="2539014097" sldId="2089"/>
+            <ac:spMk id="7" creationId="{EDBA8729-E4FB-4096-A8CC-19011C9B0906}"/>
+          </ac:spMkLst>
+        </pc:spChg>
+        <pc:spChg chg="add mod">
+          <ac:chgData name="Thien Nguyen Le Quynh" userId="57a43e30-6e77-464d-a565-b6c4b6c26d7f" providerId="ADAL" clId="{D9F54EBF-23BD-4BFC-8A23-82F896ADFCF4}" dt="2020-11-18T04:23:28.770" v="356" actId="1036"/>
+          <ac:spMkLst>
+            <pc:docMk/>
+            <pc:sldMk cId="2539014097" sldId="2089"/>
+            <ac:spMk id="8" creationId="{6880087D-D974-4361-9874-E01F00FFCBF0}"/>
+          </ac:spMkLst>
+        </pc:spChg>
+        <pc:spChg chg="add del mod">
+          <ac:chgData name="Thien Nguyen Le Quynh" userId="57a43e30-6e77-464d-a565-b6c4b6c26d7f" providerId="ADAL" clId="{D9F54EBF-23BD-4BFC-8A23-82F896ADFCF4}" dt="2020-11-18T04:14:42.190" v="112" actId="478"/>
+          <ac:spMkLst>
+            <pc:docMk/>
+            <pc:sldMk cId="2539014097" sldId="2089"/>
+            <ac:spMk id="9" creationId="{F742374F-6450-4650-AC05-4FBCA9E18C7E}"/>
+          </ac:spMkLst>
+        </pc:spChg>
+        <pc:spChg chg="add mod">
+          <ac:chgData name="Thien Nguyen Le Quynh" userId="57a43e30-6e77-464d-a565-b6c4b6c26d7f" providerId="ADAL" clId="{D9F54EBF-23BD-4BFC-8A23-82F896ADFCF4}" dt="2020-11-18T04:34:23.799" v="381" actId="207"/>
+          <ac:spMkLst>
+            <pc:docMk/>
+            <pc:sldMk cId="2539014097" sldId="2089"/>
+            <ac:spMk id="10" creationId="{44782C53-65B8-474D-AA06-BD0B0E0E4F66}"/>
+          </ac:spMkLst>
+        </pc:spChg>
+        <pc:spChg chg="add mod">
+          <ac:chgData name="Thien Nguyen Le Quynh" userId="57a43e30-6e77-464d-a565-b6c4b6c26d7f" providerId="ADAL" clId="{D9F54EBF-23BD-4BFC-8A23-82F896ADFCF4}" dt="2020-11-18T04:27:03.147" v="369" actId="20577"/>
+          <ac:spMkLst>
+            <pc:docMk/>
+            <pc:sldMk cId="2539014097" sldId="2089"/>
+            <ac:spMk id="18" creationId="{6A600DD4-E11F-4F87-A325-472A178B5916}"/>
+          </ac:spMkLst>
+        </pc:spChg>
+        <pc:spChg chg="add mod">
+          <ac:chgData name="Thien Nguyen Le Quynh" userId="57a43e30-6e77-464d-a565-b6c4b6c26d7f" providerId="ADAL" clId="{D9F54EBF-23BD-4BFC-8A23-82F896ADFCF4}" dt="2020-11-18T04:27:08.089" v="374" actId="20577"/>
+          <ac:spMkLst>
+            <pc:docMk/>
+            <pc:sldMk cId="2539014097" sldId="2089"/>
+            <ac:spMk id="19" creationId="{EB1F3AD0-0B68-4284-AB2C-F237F5102B3A}"/>
+          </ac:spMkLst>
+        </pc:spChg>
+        <pc:spChg chg="add mod">
+          <ac:chgData name="Thien Nguyen Le Quynh" userId="57a43e30-6e77-464d-a565-b6c4b6c26d7f" providerId="ADAL" clId="{D9F54EBF-23BD-4BFC-8A23-82F896ADFCF4}" dt="2020-11-18T04:22:15.720" v="299" actId="20577"/>
+          <ac:spMkLst>
+            <pc:docMk/>
+            <pc:sldMk cId="2539014097" sldId="2089"/>
+            <ac:spMk id="23" creationId="{115E1A4F-AFD2-415C-BE18-95D2B471154A}"/>
+          </ac:spMkLst>
+        </pc:spChg>
+        <pc:cxnChg chg="add mod">
+          <ac:chgData name="Thien Nguyen Le Quynh" userId="57a43e30-6e77-464d-a565-b6c4b6c26d7f" providerId="ADAL" clId="{D9F54EBF-23BD-4BFC-8A23-82F896ADFCF4}" dt="2020-11-18T04:34:51.911" v="382" actId="13822"/>
+          <ac:cxnSpMkLst>
+            <pc:docMk/>
+            <pc:sldMk cId="2539014097" sldId="2089"/>
+            <ac:cxnSpMk id="12" creationId="{B259A724-50DE-4349-8368-FB794D07CE46}"/>
+          </ac:cxnSpMkLst>
+        </pc:cxnChg>
+        <pc:cxnChg chg="add mod">
+          <ac:chgData name="Thien Nguyen Le Quynh" userId="57a43e30-6e77-464d-a565-b6c4b6c26d7f" providerId="ADAL" clId="{D9F54EBF-23BD-4BFC-8A23-82F896ADFCF4}" dt="2020-11-18T04:34:51.911" v="382" actId="13822"/>
+          <ac:cxnSpMkLst>
+            <pc:docMk/>
+            <pc:sldMk cId="2539014097" sldId="2089"/>
+            <ac:cxnSpMk id="14" creationId="{429828D8-2F22-428F-9C46-4CD656BBEE57}"/>
+          </ac:cxnSpMkLst>
+        </pc:cxnChg>
+        <pc:cxnChg chg="add mod">
+          <ac:chgData name="Thien Nguyen Le Quynh" userId="57a43e30-6e77-464d-a565-b6c4b6c26d7f" providerId="ADAL" clId="{D9F54EBF-23BD-4BFC-8A23-82F896ADFCF4}" dt="2020-11-18T04:34:51.911" v="382" actId="13822"/>
+          <ac:cxnSpMkLst>
+            <pc:docMk/>
+            <pc:sldMk cId="2539014097" sldId="2089"/>
+            <ac:cxnSpMk id="17" creationId="{62F0360D-47B7-4058-8E36-CAC6AC813A3E}"/>
+          </ac:cxnSpMkLst>
+        </pc:cxnChg>
+      </pc:sldChg>
+      <pc:sldChg chg="addSp delSp modSp add ord">
+        <pc:chgData name="Thien Nguyen Le Quynh" userId="57a43e30-6e77-464d-a565-b6c4b6c26d7f" providerId="ADAL" clId="{D9F54EBF-23BD-4BFC-8A23-82F896ADFCF4}" dt="2020-11-18T04:52:14.080" v="440"/>
+        <pc:sldMkLst>
+          <pc:docMk/>
+          <pc:sldMk cId="2013221423" sldId="2090"/>
+        </pc:sldMkLst>
+        <pc:spChg chg="del">
+          <ac:chgData name="Thien Nguyen Le Quynh" userId="57a43e30-6e77-464d-a565-b6c4b6c26d7f" providerId="ADAL" clId="{D9F54EBF-23BD-4BFC-8A23-82F896ADFCF4}" dt="2020-11-18T04:23:04.746" v="300"/>
+          <ac:spMkLst>
+            <pc:docMk/>
+            <pc:sldMk cId="2013221423" sldId="2090"/>
+            <ac:spMk id="2" creationId="{575DE408-059E-40F3-AF26-C5B8B55D5130}"/>
+          </ac:spMkLst>
+        </pc:spChg>
+        <pc:spChg chg="del">
+          <ac:chgData name="Thien Nguyen Le Quynh" userId="57a43e30-6e77-464d-a565-b6c4b6c26d7f" providerId="ADAL" clId="{D9F54EBF-23BD-4BFC-8A23-82F896ADFCF4}" dt="2020-11-18T04:23:04.746" v="300"/>
+          <ac:spMkLst>
+            <pc:docMk/>
+            <pc:sldMk cId="2013221423" sldId="2090"/>
+            <ac:spMk id="3" creationId="{9A5B38C2-87DE-42DB-91C4-31B85545E602}"/>
+          </ac:spMkLst>
+        </pc:spChg>
+        <pc:spChg chg="add mod">
+          <ac:chgData name="Thien Nguyen Le Quynh" userId="57a43e30-6e77-464d-a565-b6c4b6c26d7f" providerId="ADAL" clId="{D9F54EBF-23BD-4BFC-8A23-82F896ADFCF4}" dt="2020-11-18T04:23:17.833" v="334" actId="20577"/>
+          <ac:spMkLst>
+            <pc:docMk/>
+            <pc:sldMk cId="2013221423" sldId="2090"/>
+            <ac:spMk id="4" creationId="{942D2590-7D3B-4777-81DB-254548644C23}"/>
+          </ac:spMkLst>
+        </pc:spChg>
+        <pc:spChg chg="add mod">
+          <ac:chgData name="Thien Nguyen Le Quynh" userId="57a43e30-6e77-464d-a565-b6c4b6c26d7f" providerId="ADAL" clId="{D9F54EBF-23BD-4BFC-8A23-82F896ADFCF4}" dt="2020-11-18T04:23:04.746" v="300"/>
+          <ac:spMkLst>
+            <pc:docMk/>
+            <pc:sldMk cId="2013221423" sldId="2090"/>
+            <ac:spMk id="5" creationId="{19BFC74E-262A-4C36-8249-C019BB1146EF}"/>
+          </ac:spMkLst>
+        </pc:spChg>
+      </pc:sldChg>
+      <pc:sldChg chg="addSp delSp add del">
+        <pc:chgData name="Thien Nguyen Le Quynh" userId="57a43e30-6e77-464d-a565-b6c4b6c26d7f" providerId="ADAL" clId="{D9F54EBF-23BD-4BFC-8A23-82F896ADFCF4}" dt="2020-11-18T04:49:43.148" v="430" actId="2696"/>
+        <pc:sldMkLst>
+          <pc:docMk/>
+          <pc:sldMk cId="3359376004" sldId="2091"/>
+        </pc:sldMkLst>
+        <pc:spChg chg="del">
+          <ac:chgData name="Thien Nguyen Le Quynh" userId="57a43e30-6e77-464d-a565-b6c4b6c26d7f" providerId="ADAL" clId="{D9F54EBF-23BD-4BFC-8A23-82F896ADFCF4}" dt="2020-11-18T04:33:36.477" v="376" actId="478"/>
+          <ac:spMkLst>
+            <pc:docMk/>
+            <pc:sldMk cId="3359376004" sldId="2091"/>
+            <ac:spMk id="2" creationId="{D9C58F30-73FB-481D-9352-AF6E349AAA70}"/>
+          </ac:spMkLst>
+        </pc:spChg>
+        <pc:spChg chg="del">
+          <ac:chgData name="Thien Nguyen Le Quynh" userId="57a43e30-6e77-464d-a565-b6c4b6c26d7f" providerId="ADAL" clId="{D9F54EBF-23BD-4BFC-8A23-82F896ADFCF4}" dt="2020-11-18T04:33:38.218" v="377" actId="478"/>
+          <ac:spMkLst>
+            <pc:docMk/>
+            <pc:sldMk cId="3359376004" sldId="2091"/>
+            <ac:spMk id="3" creationId="{A379311C-C7E5-4964-8F84-1F62A9D1FEA4}"/>
+          </ac:spMkLst>
+        </pc:spChg>
+        <pc:picChg chg="add del">
+          <ac:chgData name="Thien Nguyen Le Quynh" userId="57a43e30-6e77-464d-a565-b6c4b6c26d7f" providerId="ADAL" clId="{D9F54EBF-23BD-4BFC-8A23-82F896ADFCF4}" dt="2020-11-18T04:49:16.835" v="427" actId="478"/>
+          <ac:picMkLst>
+            <pc:docMk/>
+            <pc:sldMk cId="3359376004" sldId="2091"/>
+            <ac:picMk id="1026" creationId="{068AC992-0711-4077-8CFB-C136A1426F6D}"/>
+          </ac:picMkLst>
+        </pc:picChg>
+      </pc:sldChg>
+      <pc:sldChg chg="addSp modSp add">
+        <pc:chgData name="Thien Nguyen Le Quynh" userId="57a43e30-6e77-464d-a565-b6c4b6c26d7f" providerId="ADAL" clId="{D9F54EBF-23BD-4BFC-8A23-82F896ADFCF4}" dt="2020-11-18T04:45:20.145" v="425" actId="27636"/>
+        <pc:sldMkLst>
+          <pc:docMk/>
+          <pc:sldMk cId="732496175" sldId="2092"/>
+        </pc:sldMkLst>
+        <pc:spChg chg="mod">
+          <ac:chgData name="Thien Nguyen Le Quynh" userId="57a43e30-6e77-464d-a565-b6c4b6c26d7f" providerId="ADAL" clId="{D9F54EBF-23BD-4BFC-8A23-82F896ADFCF4}" dt="2020-11-18T04:44:26.398" v="398" actId="20577"/>
+          <ac:spMkLst>
+            <pc:docMk/>
+            <pc:sldMk cId="732496175" sldId="2092"/>
+            <ac:spMk id="2" creationId="{9C7B1620-D7AA-463A-BDF5-B699B58A0278}"/>
+          </ac:spMkLst>
+        </pc:spChg>
+        <pc:spChg chg="mod">
+          <ac:chgData name="Thien Nguyen Le Quynh" userId="57a43e30-6e77-464d-a565-b6c4b6c26d7f" providerId="ADAL" clId="{D9F54EBF-23BD-4BFC-8A23-82F896ADFCF4}" dt="2020-11-18T04:45:20.145" v="425" actId="27636"/>
+          <ac:spMkLst>
+            <pc:docMk/>
+            <pc:sldMk cId="732496175" sldId="2092"/>
+            <ac:spMk id="3" creationId="{AF89AE30-DDBC-41F5-9D1B-030649C92CDB}"/>
+          </ac:spMkLst>
+        </pc:spChg>
+        <pc:grpChg chg="add mod">
+          <ac:chgData name="Thien Nguyen Le Quynh" userId="57a43e30-6e77-464d-a565-b6c4b6c26d7f" providerId="ADAL" clId="{D9F54EBF-23BD-4BFC-8A23-82F896ADFCF4}" dt="2020-11-18T04:45:16.455" v="423" actId="1036"/>
+          <ac:grpSpMkLst>
+            <pc:docMk/>
+            <pc:sldMk cId="732496175" sldId="2092"/>
+            <ac:grpSpMk id="5" creationId="{40824225-9CD2-445C-921B-DD52E6D4BE66}"/>
+          </ac:grpSpMkLst>
+        </pc:grpChg>
+        <pc:cxnChg chg="add mod">
+          <ac:chgData name="Thien Nguyen Le Quynh" userId="57a43e30-6e77-464d-a565-b6c4b6c26d7f" providerId="ADAL" clId="{D9F54EBF-23BD-4BFC-8A23-82F896ADFCF4}" dt="2020-11-18T04:45:16.455" v="423" actId="1036"/>
+          <ac:cxnSpMkLst>
+            <pc:docMk/>
+            <pc:sldMk cId="732496175" sldId="2092"/>
+            <ac:cxnSpMk id="4" creationId="{0B5519BA-04BE-40AC-B7C8-DBCA6C404F3E}"/>
+          </ac:cxnSpMkLst>
+        </pc:cxnChg>
+      </pc:sldChg>
+      <pc:sldChg chg="addSp delSp modSp add modAnim">
+        <pc:chgData name="Thien Nguyen Le Quynh" userId="57a43e30-6e77-464d-a565-b6c4b6c26d7f" providerId="ADAL" clId="{D9F54EBF-23BD-4BFC-8A23-82F896ADFCF4}" dt="2020-11-18T04:51:54.583" v="439"/>
+        <pc:sldMkLst>
+          <pc:docMk/>
+          <pc:sldMk cId="2021647859" sldId="2093"/>
+        </pc:sldMkLst>
+        <pc:spChg chg="del">
+          <ac:chgData name="Thien Nguyen Le Quynh" userId="57a43e30-6e77-464d-a565-b6c4b6c26d7f" providerId="ADAL" clId="{D9F54EBF-23BD-4BFC-8A23-82F896ADFCF4}" dt="2020-11-18T04:50:06.329" v="432"/>
+          <ac:spMkLst>
+            <pc:docMk/>
+            <pc:sldMk cId="2021647859" sldId="2093"/>
+            <ac:spMk id="2" creationId="{48FDD36A-7745-40D9-A6E6-86BDDA28D6B8}"/>
+          </ac:spMkLst>
+        </pc:spChg>
+        <pc:spChg chg="del">
+          <ac:chgData name="Thien Nguyen Le Quynh" userId="57a43e30-6e77-464d-a565-b6c4b6c26d7f" providerId="ADAL" clId="{D9F54EBF-23BD-4BFC-8A23-82F896ADFCF4}" dt="2020-11-18T04:50:06.329" v="432"/>
+          <ac:spMkLst>
+            <pc:docMk/>
+            <pc:sldMk cId="2021647859" sldId="2093"/>
+            <ac:spMk id="3" creationId="{54C5C48C-7C26-420E-847C-1422A16FFDA2}"/>
+          </ac:spMkLst>
+        </pc:spChg>
+        <pc:spChg chg="add mod">
+          <ac:chgData name="Thien Nguyen Le Quynh" userId="57a43e30-6e77-464d-a565-b6c4b6c26d7f" providerId="ADAL" clId="{D9F54EBF-23BD-4BFC-8A23-82F896ADFCF4}" dt="2020-11-18T04:50:35.952" v="435" actId="207"/>
+          <ac:spMkLst>
+            <pc:docMk/>
+            <pc:sldMk cId="2021647859" sldId="2093"/>
+            <ac:spMk id="4" creationId="{B78105FA-2B6E-4857-AEE4-C0E7A69CA575}"/>
+          </ac:spMkLst>
+        </pc:spChg>
+        <pc:spChg chg="add mod">
+          <ac:chgData name="Thien Nguyen Le Quynh" userId="57a43e30-6e77-464d-a565-b6c4b6c26d7f" providerId="ADAL" clId="{D9F54EBF-23BD-4BFC-8A23-82F896ADFCF4}" dt="2020-11-18T04:50:35.952" v="435" actId="207"/>
+          <ac:spMkLst>
+            <pc:docMk/>
+            <pc:sldMk cId="2021647859" sldId="2093"/>
+            <ac:spMk id="5" creationId="{490117F7-62B8-4472-BFE0-A1A55B481BC1}"/>
+          </ac:spMkLst>
+        </pc:spChg>
+        <pc:grpChg chg="add mod">
+          <ac:chgData name="Thien Nguyen Le Quynh" userId="57a43e30-6e77-464d-a565-b6c4b6c26d7f" providerId="ADAL" clId="{D9F54EBF-23BD-4BFC-8A23-82F896ADFCF4}" dt="2020-11-18T04:50:35.952" v="435" actId="207"/>
+          <ac:grpSpMkLst>
+            <pc:docMk/>
+            <pc:sldMk cId="2021647859" sldId="2093"/>
+            <ac:grpSpMk id="6" creationId="{8FD0B487-378C-4CAE-AD94-1BC01F25D18C}"/>
+          </ac:grpSpMkLst>
+        </pc:grpChg>
+        <pc:picChg chg="add del mod">
+          <ac:chgData name="Thien Nguyen Le Quynh" userId="57a43e30-6e77-464d-a565-b6c4b6c26d7f" providerId="ADAL" clId="{D9F54EBF-23BD-4BFC-8A23-82F896ADFCF4}" dt="2020-11-18T04:51:04.989" v="436" actId="478"/>
+          <ac:picMkLst>
+            <pc:docMk/>
+            <pc:sldMk cId="2021647859" sldId="2093"/>
+            <ac:picMk id="79" creationId="{0437BD30-665E-4171-B5B9-072856AD815E}"/>
+          </ac:picMkLst>
+        </pc:picChg>
+        <pc:picChg chg="add del">
+          <ac:chgData name="Thien Nguyen Le Quynh" userId="57a43e30-6e77-464d-a565-b6c4b6c26d7f" providerId="ADAL" clId="{D9F54EBF-23BD-4BFC-8A23-82F896ADFCF4}" dt="2020-11-18T04:51:51.821" v="438"/>
+          <ac:picMkLst>
+            <pc:docMk/>
+            <pc:sldMk cId="2021647859" sldId="2093"/>
+            <ac:picMk id="80" creationId="{9B1A0556-64F0-4A0A-9122-F113D61BF45D}"/>
+          </ac:picMkLst>
+        </pc:picChg>
+        <pc:picChg chg="add">
+          <ac:chgData name="Thien Nguyen Le Quynh" userId="57a43e30-6e77-464d-a565-b6c4b6c26d7f" providerId="ADAL" clId="{D9F54EBF-23BD-4BFC-8A23-82F896ADFCF4}" dt="2020-11-18T04:51:54.583" v="439"/>
+          <ac:picMkLst>
+            <pc:docMk/>
+            <pc:sldMk cId="2021647859" sldId="2093"/>
+            <ac:picMk id="81" creationId="{396AE672-DB15-4DC0-AD26-DD098A8904F8}"/>
+          </ac:picMkLst>
+        </pc:picChg>
       </pc:sldChg>
     </pc:docChg>
   </pc:docChgLst>
@@ -5192,7 +5192,7 @@
           <a:p>
             <a:fld id="{0CD28075-2E73-4335-AA24-3F18AB76741D}" type="datetimeFigureOut">
               <a:rPr lang="en-US" smtClean="0"/>
-              <a:t>11/28/2020</a:t>
+              <a:t>2/25/2021</a:t>
             </a:fld>
             <a:endParaRPr lang="en-US"/>
           </a:p>
@@ -5848,7 +5848,7 @@
           <a:p>
             <a:fld id="{56768435-DD3B-A64A-83AE-6E1472C734DE}" type="datetimeFigureOut">
               <a:rPr lang="en-US" smtClean="0"/>
-              <a:t>11/28/2020</a:t>
+              <a:t>2/25/2021</a:t>
             </a:fld>
             <a:endParaRPr lang="en-US"/>
           </a:p>
@@ -6159,7 +6159,7 @@
           <a:p>
             <a:fld id="{56768435-DD3B-A64A-83AE-6E1472C734DE}" type="datetimeFigureOut">
               <a:rPr lang="en-US" smtClean="0"/>
-              <a:t>11/28/2020</a:t>
+              <a:t>2/25/2021</a:t>
             </a:fld>
             <a:endParaRPr lang="en-US"/>
           </a:p>
@@ -6447,7 +6447,7 @@
           <a:p>
             <a:fld id="{56768435-DD3B-A64A-83AE-6E1472C734DE}" type="datetimeFigureOut">
               <a:rPr lang="en-US" smtClean="0"/>
-              <a:t>11/28/2020</a:t>
+              <a:t>2/25/2021</a:t>
             </a:fld>
             <a:endParaRPr lang="en-US"/>
           </a:p>
@@ -6681,7 +6681,7 @@
           <a:p>
             <a:fld id="{56768435-DD3B-A64A-83AE-6E1472C734DE}" type="datetimeFigureOut">
               <a:rPr lang="en-US" smtClean="0"/>
-              <a:t>11/28/2020</a:t>
+              <a:t>2/25/2021</a:t>
             </a:fld>
             <a:endParaRPr lang="en-US"/>
           </a:p>
@@ -6954,7 +6954,7 @@
           <a:p>
             <a:fld id="{56768435-DD3B-A64A-83AE-6E1472C734DE}" type="datetimeFigureOut">
               <a:rPr lang="en-US" smtClean="0"/>
-              <a:t>11/28/2020</a:t>
+              <a:t>2/25/2021</a:t>
             </a:fld>
             <a:endParaRPr lang="en-US"/>
           </a:p>
@@ -7219,7 +7219,7 @@
           <a:p>
             <a:fld id="{56768435-DD3B-A64A-83AE-6E1472C734DE}" type="datetimeFigureOut">
               <a:rPr lang="en-US" smtClean="0"/>
-              <a:t>11/28/2020</a:t>
+              <a:t>2/25/2021</a:t>
             </a:fld>
             <a:endParaRPr lang="en-US"/>
           </a:p>
@@ -7631,7 +7631,7 @@
           <a:p>
             <a:fld id="{56768435-DD3B-A64A-83AE-6E1472C734DE}" type="datetimeFigureOut">
               <a:rPr lang="en-US" smtClean="0"/>
-              <a:t>11/28/2020</a:t>
+              <a:t>2/25/2021</a:t>
             </a:fld>
             <a:endParaRPr lang="en-US"/>
           </a:p>
@@ -7772,7 +7772,7 @@
           <a:p>
             <a:fld id="{56768435-DD3B-A64A-83AE-6E1472C734DE}" type="datetimeFigureOut">
               <a:rPr lang="en-US" smtClean="0"/>
-              <a:t>11/28/2020</a:t>
+              <a:t>2/25/2021</a:t>
             </a:fld>
             <a:endParaRPr lang="en-US"/>
           </a:p>
@@ -7941,7 +7941,7 @@
           <a:p>
             <a:fld id="{56768435-DD3B-A64A-83AE-6E1472C734DE}" type="datetimeFigureOut">
               <a:rPr lang="en-US" smtClean="0"/>
-              <a:t>11/28/2020</a:t>
+              <a:t>2/25/2021</a:t>
             </a:fld>
             <a:endParaRPr lang="en-US"/>
           </a:p>
@@ -8110,7 +8110,7 @@
           <a:p>
             <a:fld id="{56768435-DD3B-A64A-83AE-6E1472C734DE}" type="datetimeFigureOut">
               <a:rPr lang="en-US" smtClean="0"/>
-              <a:t>11/28/2020</a:t>
+              <a:t>2/25/2021</a:t>
             </a:fld>
             <a:endParaRPr lang="en-US"/>
           </a:p>
@@ -8223,7 +8223,7 @@
           <a:p>
             <a:fld id="{56768435-DD3B-A64A-83AE-6E1472C734DE}" type="datetimeFigureOut">
               <a:rPr lang="en-US" smtClean="0"/>
-              <a:t>11/28/2020</a:t>
+              <a:t>2/25/2021</a:t>
             </a:fld>
             <a:endParaRPr lang="en-US"/>
           </a:p>
@@ -8468,7 +8468,7 @@
             <a:fld id="{56768435-DD3B-A64A-83AE-6E1472C734DE}" type="datetimeFigureOut">
               <a:rPr lang="en-US" smtClean="0"/>
               <a:pPr/>
-              <a:t>11/28/2020</a:t>
+              <a:t>2/25/2021</a:t>
             </a:fld>
             <a:endParaRPr lang="en-US">
               <a:latin typeface="Open Sans" panose="020B0606030504020204" pitchFamily="34" charset="0"/>
@@ -18978,7 +18978,7 @@
           <p:nvPr>
             <p:extLst>
               <p:ext uri="{D42A27DB-BD31-4B8C-83A1-F6EECF244321}">
-                <p14:modId xmlns:p14="http://schemas.microsoft.com/office/powerpoint/2010/main" val="825401088"/>
+                <p14:modId xmlns:p14="http://schemas.microsoft.com/office/powerpoint/2010/main" val="264201908"/>
               </p:ext>
             </p:extLst>
           </p:nvPr>
@@ -19037,7 +19037,7 @@
                     <a:p>
                       <a:r>
                         <a:rPr lang="en-US" dirty="0"/>
-                        <a:t>.NET 5</a:t>
+                        <a:t>.NET 6</a:t>
                       </a:r>
                     </a:p>
                   </a:txBody>
@@ -21768,18 +21768,18 @@
 </file>
 
 <file path=customXml/item1.xml><?xml version="1.0" encoding="utf-8"?>
-<p:properties xmlns:p="http://schemas.microsoft.com/office/2006/metadata/properties" xmlns:xsi="http://www.w3.org/2001/XMLSchema-instance" xmlns:pc="http://schemas.microsoft.com/office/infopath/2007/PartnerControls">
-  <documentManagement/>
-</p:properties>
-</file>
-
-<file path=customXml/item2.xml><?xml version="1.0" encoding="utf-8"?>
 <?mso-contentType ?>
 <FormTemplates xmlns="http://schemas.microsoft.com/sharepoint/v3/contenttype/forms">
   <Display>DocumentLibraryForm</Display>
   <Edit>DocumentLibraryForm</Edit>
   <New>DocumentLibraryForm</New>
 </FormTemplates>
+</file>
+
+<file path=customXml/item2.xml><?xml version="1.0" encoding="utf-8"?>
+<p:properties xmlns:p="http://schemas.microsoft.com/office/2006/metadata/properties" xmlns:xsi="http://www.w3.org/2001/XMLSchema-instance" xmlns:pc="http://schemas.microsoft.com/office/infopath/2007/PartnerControls">
+  <documentManagement/>
+</p:properties>
 </file>
 
 <file path=customXml/item3.xml><?xml version="1.0" encoding="utf-8"?>
@@ -22006,18 +22006,18 @@
 </file>
 
 <file path=customXml/itemProps1.xml><?xml version="1.0" encoding="utf-8"?>
-<ds:datastoreItem xmlns:ds="http://schemas.openxmlformats.org/officeDocument/2006/customXml" ds:itemID="{B3431CF8-6520-4D1C-B691-C78D15CA815D}">
+<ds:datastoreItem xmlns:ds="http://schemas.openxmlformats.org/officeDocument/2006/customXml" ds:itemID="{4894A4A9-103A-4702-ABF7-4691F00C07B1}">
   <ds:schemaRefs>
-    <ds:schemaRef ds:uri="http://schemas.microsoft.com/office/2006/metadata/properties"/>
-    <ds:schemaRef ds:uri="http://schemas.microsoft.com/office/infopath/2007/PartnerControls"/>
+    <ds:schemaRef ds:uri="http://schemas.microsoft.com/sharepoint/v3/contenttype/forms"/>
   </ds:schemaRefs>
 </ds:datastoreItem>
 </file>
 
 <file path=customXml/itemProps2.xml><?xml version="1.0" encoding="utf-8"?>
-<ds:datastoreItem xmlns:ds="http://schemas.openxmlformats.org/officeDocument/2006/customXml" ds:itemID="{4894A4A9-103A-4702-ABF7-4691F00C07B1}">
+<ds:datastoreItem xmlns:ds="http://schemas.openxmlformats.org/officeDocument/2006/customXml" ds:itemID="{B3431CF8-6520-4D1C-B691-C78D15CA815D}">
   <ds:schemaRefs>
-    <ds:schemaRef ds:uri="http://schemas.microsoft.com/sharepoint/v3/contenttype/forms"/>
+    <ds:schemaRef ds:uri="http://schemas.microsoft.com/office/2006/metadata/properties"/>
+    <ds:schemaRef ds:uri="http://schemas.microsoft.com/office/infopath/2007/PartnerControls"/>
   </ds:schemaRefs>
 </ds:datastoreItem>
 </file>

</xml_diff>